<commit_message>
Fixed the name Types to proper CIQ use in the diagram, XML and main markup file. Added the email alias as an ElectronicAddressIdentifier in the diagram, XML and main markup file.
These changes need to be made to the python but I was unsure how to do it without screwing it up.
</commit_message>
<xml_diff>
--- a/idioms/threat-actor/identity-group/diagram.pptx
+++ b/idioms/threat-actor/identity-group/diagram.pptx
@@ -288,7 +288,7 @@
           <a:p>
             <a:fld id="{13F24B86-36D2-4655-BE2F-98B661AC85E1}" type="datetimeFigureOut">
               <a:rPr lang="en-US" smtClean="0"/>
-              <a:t>3/24/2014</a:t>
+              <a:t>3/30/14</a:t>
             </a:fld>
             <a:endParaRPr lang="en-US"/>
           </a:p>
@@ -458,7 +458,7 @@
           <a:p>
             <a:fld id="{13F24B86-36D2-4655-BE2F-98B661AC85E1}" type="datetimeFigureOut">
               <a:rPr lang="en-US" smtClean="0"/>
-              <a:t>3/24/2014</a:t>
+              <a:t>3/30/14</a:t>
             </a:fld>
             <a:endParaRPr lang="en-US"/>
           </a:p>
@@ -638,7 +638,7 @@
           <a:p>
             <a:fld id="{13F24B86-36D2-4655-BE2F-98B661AC85E1}" type="datetimeFigureOut">
               <a:rPr lang="en-US" smtClean="0"/>
-              <a:t>3/24/2014</a:t>
+              <a:t>3/30/14</a:t>
             </a:fld>
             <a:endParaRPr lang="en-US"/>
           </a:p>
@@ -808,7 +808,7 @@
           <a:p>
             <a:fld id="{13F24B86-36D2-4655-BE2F-98B661AC85E1}" type="datetimeFigureOut">
               <a:rPr lang="en-US" smtClean="0"/>
-              <a:t>3/24/2014</a:t>
+              <a:t>3/30/14</a:t>
             </a:fld>
             <a:endParaRPr lang="en-US"/>
           </a:p>
@@ -1054,7 +1054,7 @@
           <a:p>
             <a:fld id="{13F24B86-36D2-4655-BE2F-98B661AC85E1}" type="datetimeFigureOut">
               <a:rPr lang="en-US" smtClean="0"/>
-              <a:t>3/24/2014</a:t>
+              <a:t>3/30/14</a:t>
             </a:fld>
             <a:endParaRPr lang="en-US"/>
           </a:p>
@@ -1342,7 +1342,7 @@
           <a:p>
             <a:fld id="{13F24B86-36D2-4655-BE2F-98B661AC85E1}" type="datetimeFigureOut">
               <a:rPr lang="en-US" smtClean="0"/>
-              <a:t>3/24/2014</a:t>
+              <a:t>3/30/14</a:t>
             </a:fld>
             <a:endParaRPr lang="en-US"/>
           </a:p>
@@ -1764,7 +1764,7 @@
           <a:p>
             <a:fld id="{13F24B86-36D2-4655-BE2F-98B661AC85E1}" type="datetimeFigureOut">
               <a:rPr lang="en-US" smtClean="0"/>
-              <a:t>3/24/2014</a:t>
+              <a:t>3/30/14</a:t>
             </a:fld>
             <a:endParaRPr lang="en-US"/>
           </a:p>
@@ -1882,7 +1882,7 @@
           <a:p>
             <a:fld id="{13F24B86-36D2-4655-BE2F-98B661AC85E1}" type="datetimeFigureOut">
               <a:rPr lang="en-US" smtClean="0"/>
-              <a:t>3/24/2014</a:t>
+              <a:t>3/30/14</a:t>
             </a:fld>
             <a:endParaRPr lang="en-US"/>
           </a:p>
@@ -1977,7 +1977,7 @@
           <a:p>
             <a:fld id="{13F24B86-36D2-4655-BE2F-98B661AC85E1}" type="datetimeFigureOut">
               <a:rPr lang="en-US" smtClean="0"/>
-              <a:t>3/24/2014</a:t>
+              <a:t>3/30/14</a:t>
             </a:fld>
             <a:endParaRPr lang="en-US"/>
           </a:p>
@@ -2254,7 +2254,7 @@
           <a:p>
             <a:fld id="{13F24B86-36D2-4655-BE2F-98B661AC85E1}" type="datetimeFigureOut">
               <a:rPr lang="en-US" smtClean="0"/>
-              <a:t>3/24/2014</a:t>
+              <a:t>3/30/14</a:t>
             </a:fld>
             <a:endParaRPr lang="en-US"/>
           </a:p>
@@ -2507,7 +2507,7 @@
           <a:p>
             <a:fld id="{13F24B86-36D2-4655-BE2F-98B661AC85E1}" type="datetimeFigureOut">
               <a:rPr lang="en-US" smtClean="0"/>
-              <a:t>3/24/2014</a:t>
+              <a:t>3/30/14</a:t>
             </a:fld>
             <a:endParaRPr lang="en-US"/>
           </a:p>
@@ -2720,7 +2720,7 @@
           <a:p>
             <a:fld id="{13F24B86-36D2-4655-BE2F-98B661AC85E1}" type="datetimeFigureOut">
               <a:rPr lang="en-US" smtClean="0"/>
-              <a:t>3/24/2014</a:t>
+              <a:t>3/30/14</a:t>
             </a:fld>
             <a:endParaRPr lang="en-US"/>
           </a:p>
@@ -3104,14 +3104,14 @@
           <p:nvPr>
             <p:extLst>
               <p:ext uri="{D42A27DB-BD31-4B8C-83A1-F6EECF244321}">
-                <p14:modId xmlns:p14="http://schemas.microsoft.com/office/powerpoint/2010/main" val="1797106552"/>
+                <p14:modId xmlns:p14="http://schemas.microsoft.com/office/powerpoint/2010/main" val="2693691214"/>
               </p:ext>
             </p:extLst>
           </p:nvPr>
         </p:nvGraphicFramePr>
         <p:xfrm>
           <a:off x="831307" y="723881"/>
-          <a:ext cx="6283868" cy="4480560"/>
+          <a:ext cx="6283868" cy="4998720"/>
         </p:xfrm>
         <a:graphic>
           <a:graphicData uri="http://schemas.openxmlformats.org/drawingml/2006/table">
@@ -3520,13 +3520,6 @@
                         </a:rPr>
                         <a:t>STIXCIQIdentity3.0Type</a:t>
                       </a:r>
-                      <a:endParaRPr lang="en-US" sz="1100" b="0" dirty="0" smtClean="0">
-                        <a:solidFill>
-                          <a:schemeClr val="bg1">
-                            <a:lumMod val="50000"/>
-                          </a:schemeClr>
-                        </a:solidFill>
-                      </a:endParaRPr>
                     </a:p>
                   </a:txBody>
                   <a:tcPr>
@@ -3567,11 +3560,7 @@
                     <a:p>
                       <a:r>
                         <a:rPr lang="en-US" sz="1100" dirty="0" smtClean="0"/>
-                        <a:t>    </a:t>
-                      </a:r>
-                      <a:r>
-                        <a:rPr lang="en-US" sz="1100" dirty="0" smtClean="0"/>
-                        <a:t>Specification</a:t>
+                        <a:t>    Specification</a:t>
                       </a:r>
                       <a:endParaRPr lang="en-US" sz="1100" b="0" dirty="0"/>
                     </a:p>
@@ -3940,6 +3929,131 @@
                     <a:p>
                       <a:r>
                         <a:rPr lang="en-US" sz="1100" b="0" dirty="0" smtClean="0"/>
+                        <a:t>                </a:t>
+                      </a:r>
+                      <a:r>
+                        <a:rPr lang="en-US" sz="1100" b="0" baseline="0" dirty="0" smtClean="0"/>
+                        <a:t>     </a:t>
+                      </a:r>
+                      <a:r>
+                        <a:rPr lang="en-US" sz="1100" b="0" baseline="0" dirty="0" smtClean="0"/>
+                        <a:t>Type</a:t>
+                      </a:r>
+                      <a:endParaRPr lang="en-US" sz="1100" b="0" dirty="0"/>
+                    </a:p>
+                  </a:txBody>
+                  <a:tcPr>
+                    <a:lnL w="12700" cap="flat" cmpd="sng" algn="ctr">
+                      <a:solidFill>
+                        <a:schemeClr val="tx1"/>
+                      </a:solidFill>
+                      <a:prstDash val="solid"/>
+                      <a:round/>
+                      <a:headEnd type="none" w="med" len="med"/>
+                      <a:tailEnd type="none" w="med" len="med"/>
+                    </a:lnL>
+                    <a:lnR w="12700" cap="flat" cmpd="sng" algn="ctr">
+                      <a:solidFill>
+                        <a:schemeClr val="tx1"/>
+                      </a:solidFill>
+                      <a:prstDash val="solid"/>
+                      <a:round/>
+                      <a:headEnd type="none" w="med" len="med"/>
+                      <a:tailEnd type="none" w="med" len="med"/>
+                    </a:lnR>
+                  </a:tcPr>
+                </a:tc>
+                <a:tc gridSpan="2">
+                  <a:txBody>
+                    <a:bodyPr/>
+                    <a:lstStyle/>
+                    <a:p>
+                      <a:pPr marL="0" marR="0" indent="0" algn="l" defTabSz="914400" rtl="0" eaLnBrk="1" fontAlgn="auto" latinLnBrk="0" hangingPunct="1">
+                        <a:lnSpc>
+                          <a:spcPct val="100000"/>
+                        </a:lnSpc>
+                        <a:spcBef>
+                          <a:spcPts val="0"/>
+                        </a:spcBef>
+                        <a:spcAft>
+                          <a:spcPts val="0"/>
+                        </a:spcAft>
+                        <a:buClrTx/>
+                        <a:buSzTx/>
+                        <a:buFontTx/>
+                        <a:buNone/>
+                        <a:tabLst/>
+                        <a:defRPr/>
+                      </a:pPr>
+                      <a:r>
+                        <a:rPr lang="en-US" sz="1100" b="0" dirty="0" err="1" smtClean="0"/>
+                        <a:t>CommonUse</a:t>
+                      </a:r>
+                      <a:endParaRPr lang="en-US" sz="1100" b="0" dirty="0" smtClean="0"/>
+                    </a:p>
+                  </a:txBody>
+                  <a:tcPr>
+                    <a:lnL w="12700" cap="flat" cmpd="sng" algn="ctr">
+                      <a:solidFill>
+                        <a:schemeClr val="tx1"/>
+                      </a:solidFill>
+                      <a:prstDash val="solid"/>
+                      <a:round/>
+                      <a:headEnd type="none" w="med" len="med"/>
+                      <a:tailEnd type="none" w="med" len="med"/>
+                    </a:lnL>
+                    <a:lnR w="12700" cap="flat" cmpd="sng" algn="ctr">
+                      <a:solidFill>
+                        <a:schemeClr val="tx1"/>
+                      </a:solidFill>
+                      <a:prstDash val="solid"/>
+                      <a:round/>
+                      <a:headEnd type="none" w="med" len="med"/>
+                      <a:tailEnd type="none" w="med" len="med"/>
+                    </a:lnR>
+                    <a:lnT w="12700" cap="flat" cmpd="sng" algn="ctr">
+                      <a:noFill/>
+                      <a:prstDash val="solid"/>
+                      <a:round/>
+                      <a:headEnd type="none" w="med" len="med"/>
+                      <a:tailEnd type="none" w="med" len="med"/>
+                    </a:lnT>
+                    <a:lnB w="12700" cap="flat" cmpd="sng" algn="ctr">
+                      <a:noFill/>
+                      <a:prstDash val="solid"/>
+                      <a:round/>
+                      <a:headEnd type="none" w="med" len="med"/>
+                      <a:tailEnd type="none" w="med" len="med"/>
+                    </a:lnB>
+                    <a:lnTlToBr w="12700" cmpd="sng">
+                      <a:noFill/>
+                      <a:prstDash val="solid"/>
+                    </a:lnTlToBr>
+                    <a:lnBlToTr w="12700" cmpd="sng">
+                      <a:noFill/>
+                      <a:prstDash val="solid"/>
+                    </a:lnBlToTr>
+                  </a:tcPr>
+                </a:tc>
+                <a:tc hMerge="1">
+                  <a:txBody>
+                    <a:bodyPr/>
+                    <a:lstStyle/>
+                    <a:p>
+                      <a:endParaRPr lang="en-US"/>
+                    </a:p>
+                  </a:txBody>
+                  <a:tcPr/>
+                </a:tc>
+              </a:tr>
+              <a:tr h="144405">
+                <a:tc>
+                  <a:txBody>
+                    <a:bodyPr/>
+                    <a:lstStyle/>
+                    <a:p>
+                      <a:r>
+                        <a:rPr lang="en-US" sz="1100" b="0" dirty="0" smtClean="0"/>
                         <a:t>                    </a:t>
                       </a:r>
                       <a:r>
@@ -4112,6 +4226,131 @@
                         <a:tabLst/>
                         <a:defRPr/>
                       </a:pPr>
+                      <a:endParaRPr lang="en-US" sz="1100" b="0" dirty="0" smtClean="0"/>
+                    </a:p>
+                  </a:txBody>
+                  <a:tcPr>
+                    <a:lnL w="12700" cap="flat" cmpd="sng" algn="ctr">
+                      <a:solidFill>
+                        <a:schemeClr val="tx1"/>
+                      </a:solidFill>
+                      <a:prstDash val="solid"/>
+                      <a:round/>
+                      <a:headEnd type="none" w="med" len="med"/>
+                      <a:tailEnd type="none" w="med" len="med"/>
+                    </a:lnL>
+                    <a:lnR w="12700" cap="flat" cmpd="sng" algn="ctr">
+                      <a:solidFill>
+                        <a:schemeClr val="tx1"/>
+                      </a:solidFill>
+                      <a:prstDash val="solid"/>
+                      <a:round/>
+                      <a:headEnd type="none" w="med" len="med"/>
+                      <a:tailEnd type="none" w="med" len="med"/>
+                    </a:lnR>
+                    <a:lnT w="12700" cap="flat" cmpd="sng" algn="ctr">
+                      <a:noFill/>
+                      <a:prstDash val="solid"/>
+                      <a:round/>
+                      <a:headEnd type="none" w="med" len="med"/>
+                      <a:tailEnd type="none" w="med" len="med"/>
+                    </a:lnT>
+                    <a:lnB w="12700" cap="flat" cmpd="sng" algn="ctr">
+                      <a:noFill/>
+                      <a:prstDash val="solid"/>
+                      <a:round/>
+                      <a:headEnd type="none" w="med" len="med"/>
+                      <a:tailEnd type="none" w="med" len="med"/>
+                    </a:lnB>
+                    <a:lnTlToBr w="12700" cmpd="sng">
+                      <a:noFill/>
+                      <a:prstDash val="solid"/>
+                    </a:lnTlToBr>
+                    <a:lnBlToTr w="12700" cmpd="sng">
+                      <a:noFill/>
+                      <a:prstDash val="solid"/>
+                    </a:lnBlToTr>
+                  </a:tcPr>
+                </a:tc>
+                <a:tc hMerge="1">
+                  <a:txBody>
+                    <a:bodyPr/>
+                    <a:lstStyle/>
+                    <a:p>
+                      <a:endParaRPr lang="en-US"/>
+                    </a:p>
+                  </a:txBody>
+                  <a:tcPr/>
+                </a:tc>
+              </a:tr>
+              <a:tr h="144405">
+                <a:tc>
+                  <a:txBody>
+                    <a:bodyPr/>
+                    <a:lstStyle/>
+                    <a:p>
+                      <a:r>
+                        <a:rPr lang="en-US" sz="1100" b="0" dirty="0" smtClean="0"/>
+                        <a:t>                </a:t>
+                      </a:r>
+                      <a:r>
+                        <a:rPr lang="en-US" sz="1100" b="0" baseline="0" dirty="0" smtClean="0"/>
+                        <a:t>     </a:t>
+                      </a:r>
+                      <a:r>
+                        <a:rPr lang="en-US" sz="1100" b="0" baseline="0" dirty="0" smtClean="0"/>
+                        <a:t>Type</a:t>
+                      </a:r>
+                      <a:endParaRPr lang="en-US" sz="1100" b="0" dirty="0"/>
+                    </a:p>
+                  </a:txBody>
+                  <a:tcPr>
+                    <a:lnL w="12700" cap="flat" cmpd="sng" algn="ctr">
+                      <a:solidFill>
+                        <a:schemeClr val="tx1"/>
+                      </a:solidFill>
+                      <a:prstDash val="solid"/>
+                      <a:round/>
+                      <a:headEnd type="none" w="med" len="med"/>
+                      <a:tailEnd type="none" w="med" len="med"/>
+                    </a:lnL>
+                    <a:lnR w="12700" cap="flat" cmpd="sng" algn="ctr">
+                      <a:solidFill>
+                        <a:schemeClr val="tx1"/>
+                      </a:solidFill>
+                      <a:prstDash val="solid"/>
+                      <a:round/>
+                      <a:headEnd type="none" w="med" len="med"/>
+                      <a:tailEnd type="none" w="med" len="med"/>
+                    </a:lnR>
+                  </a:tcPr>
+                </a:tc>
+                <a:tc gridSpan="2">
+                  <a:txBody>
+                    <a:bodyPr/>
+                    <a:lstStyle/>
+                    <a:p>
+                      <a:pPr marL="0" marR="0" indent="0" algn="l" defTabSz="914400" rtl="0" eaLnBrk="1" fontAlgn="auto" latinLnBrk="0" hangingPunct="1">
+                        <a:lnSpc>
+                          <a:spcPct val="100000"/>
+                        </a:lnSpc>
+                        <a:spcBef>
+                          <a:spcPts val="0"/>
+                        </a:spcBef>
+                        <a:spcAft>
+                          <a:spcPts val="0"/>
+                        </a:spcAft>
+                        <a:buClrTx/>
+                        <a:buSzTx/>
+                        <a:buFontTx/>
+                        <a:buNone/>
+                        <a:tabLst/>
+                        <a:defRPr/>
+                      </a:pPr>
+                      <a:r>
+                        <a:rPr lang="en-US" sz="1100" b="0" smtClean="0"/>
+                        <a:t>UnofficialName</a:t>
+                      </a:r>
                       <a:endParaRPr lang="en-US" sz="1100" b="0" dirty="0" smtClean="0"/>
                     </a:p>
                   </a:txBody>
@@ -4310,127 +4549,6 @@
                     <a:p>
                       <a:r>
                         <a:rPr lang="en-US" sz="1100" b="0" dirty="0" smtClean="0"/>
-                        <a:t>                </a:t>
-                      </a:r>
-                      <a:r>
-                        <a:rPr lang="en-US" sz="1100" b="0" baseline="0" dirty="0" smtClean="0"/>
-                        <a:t>        Type</a:t>
-                      </a:r>
-                      <a:endParaRPr lang="en-US" sz="1100" b="0" dirty="0"/>
-                    </a:p>
-                  </a:txBody>
-                  <a:tcPr>
-                    <a:lnL w="12700" cap="flat" cmpd="sng" algn="ctr">
-                      <a:solidFill>
-                        <a:schemeClr val="tx1"/>
-                      </a:solidFill>
-                      <a:prstDash val="solid"/>
-                      <a:round/>
-                      <a:headEnd type="none" w="med" len="med"/>
-                      <a:tailEnd type="none" w="med" len="med"/>
-                    </a:lnL>
-                    <a:lnR w="12700" cap="flat" cmpd="sng" algn="ctr">
-                      <a:solidFill>
-                        <a:schemeClr val="tx1"/>
-                      </a:solidFill>
-                      <a:prstDash val="solid"/>
-                      <a:round/>
-                      <a:headEnd type="none" w="med" len="med"/>
-                      <a:tailEnd type="none" w="med" len="med"/>
-                    </a:lnR>
-                  </a:tcPr>
-                </a:tc>
-                <a:tc gridSpan="2">
-                  <a:txBody>
-                    <a:bodyPr/>
-                    <a:lstStyle/>
-                    <a:p>
-                      <a:pPr marL="0" marR="0" indent="0" algn="l" defTabSz="914400" rtl="0" eaLnBrk="1" fontAlgn="auto" latinLnBrk="0" hangingPunct="1">
-                        <a:lnSpc>
-                          <a:spcPct val="100000"/>
-                        </a:lnSpc>
-                        <a:spcBef>
-                          <a:spcPts val="0"/>
-                        </a:spcBef>
-                        <a:spcAft>
-                          <a:spcPts val="0"/>
-                        </a:spcAft>
-                        <a:buClrTx/>
-                        <a:buSzTx/>
-                        <a:buFontTx/>
-                        <a:buNone/>
-                        <a:tabLst/>
-                        <a:defRPr/>
-                      </a:pPr>
-                      <a:r>
-                        <a:rPr lang="en-US" sz="1100" b="0" dirty="0" err="1" smtClean="0"/>
-                        <a:t>KnownAs</a:t>
-                      </a:r>
-                      <a:endParaRPr lang="en-US" sz="1100" b="0" dirty="0" smtClean="0"/>
-                    </a:p>
-                  </a:txBody>
-                  <a:tcPr>
-                    <a:lnL w="12700" cap="flat" cmpd="sng" algn="ctr">
-                      <a:solidFill>
-                        <a:schemeClr val="tx1"/>
-                      </a:solidFill>
-                      <a:prstDash val="solid"/>
-                      <a:round/>
-                      <a:headEnd type="none" w="med" len="med"/>
-                      <a:tailEnd type="none" w="med" len="med"/>
-                    </a:lnL>
-                    <a:lnR w="12700" cap="flat" cmpd="sng" algn="ctr">
-                      <a:solidFill>
-                        <a:schemeClr val="tx1"/>
-                      </a:solidFill>
-                      <a:prstDash val="solid"/>
-                      <a:round/>
-                      <a:headEnd type="none" w="med" len="med"/>
-                      <a:tailEnd type="none" w="med" len="med"/>
-                    </a:lnR>
-                    <a:lnT w="12700" cap="flat" cmpd="sng" algn="ctr">
-                      <a:noFill/>
-                      <a:prstDash val="solid"/>
-                      <a:round/>
-                      <a:headEnd type="none" w="med" len="med"/>
-                      <a:tailEnd type="none" w="med" len="med"/>
-                    </a:lnT>
-                    <a:lnB w="12700" cap="flat" cmpd="sng" algn="ctr">
-                      <a:noFill/>
-                      <a:prstDash val="solid"/>
-                      <a:round/>
-                      <a:headEnd type="none" w="med" len="med"/>
-                      <a:tailEnd type="none" w="med" len="med"/>
-                    </a:lnB>
-                    <a:lnTlToBr w="12700" cmpd="sng">
-                      <a:noFill/>
-                      <a:prstDash val="solid"/>
-                    </a:lnTlToBr>
-                    <a:lnBlToTr w="12700" cmpd="sng">
-                      <a:noFill/>
-                      <a:prstDash val="solid"/>
-                    </a:lnBlToTr>
-                  </a:tcPr>
-                </a:tc>
-                <a:tc hMerge="1">
-                  <a:txBody>
-                    <a:bodyPr/>
-                    <a:lstStyle/>
-                    <a:p>
-                      <a:endParaRPr lang="en-US"/>
-                    </a:p>
-                  </a:txBody>
-                  <a:tcPr/>
-                </a:tc>
-              </a:tr>
-              <a:tr h="144405">
-                <a:tc>
-                  <a:txBody>
-                    <a:bodyPr/>
-                    <a:lstStyle/>
-                    <a:p>
-                      <a:r>
-                        <a:rPr lang="en-US" sz="1100" b="0" dirty="0" smtClean="0"/>
                         <a:t>        Language</a:t>
                       </a:r>
                       <a:endParaRPr lang="en-US" sz="1100" b="0" dirty="0"/>
@@ -4482,6 +4600,127 @@
                       <a:r>
                         <a:rPr lang="en-US" sz="1100" b="0" dirty="0" smtClean="0"/>
                         <a:t>Spanish</a:t>
+                      </a:r>
+                    </a:p>
+                  </a:txBody>
+                  <a:tcPr>
+                    <a:lnL w="12700" cap="flat" cmpd="sng" algn="ctr">
+                      <a:solidFill>
+                        <a:schemeClr val="tx1"/>
+                      </a:solidFill>
+                      <a:prstDash val="solid"/>
+                      <a:round/>
+                      <a:headEnd type="none" w="med" len="med"/>
+                      <a:tailEnd type="none" w="med" len="med"/>
+                    </a:lnL>
+                    <a:lnR w="12700" cap="flat" cmpd="sng" algn="ctr">
+                      <a:solidFill>
+                        <a:schemeClr val="tx1"/>
+                      </a:solidFill>
+                      <a:prstDash val="solid"/>
+                      <a:round/>
+                      <a:headEnd type="none" w="med" len="med"/>
+                      <a:tailEnd type="none" w="med" len="med"/>
+                    </a:lnR>
+                    <a:lnT w="12700" cap="flat" cmpd="sng" algn="ctr">
+                      <a:noFill/>
+                      <a:prstDash val="solid"/>
+                      <a:round/>
+                      <a:headEnd type="none" w="med" len="med"/>
+                      <a:tailEnd type="none" w="med" len="med"/>
+                    </a:lnT>
+                    <a:lnB w="12700" cap="flat" cmpd="sng" algn="ctr">
+                      <a:noFill/>
+                      <a:prstDash val="solid"/>
+                      <a:round/>
+                      <a:headEnd type="none" w="med" len="med"/>
+                      <a:tailEnd type="none" w="med" len="med"/>
+                    </a:lnB>
+                    <a:lnTlToBr w="12700" cmpd="sng">
+                      <a:noFill/>
+                      <a:prstDash val="solid"/>
+                    </a:lnTlToBr>
+                    <a:lnBlToTr w="12700" cmpd="sng">
+                      <a:noFill/>
+                      <a:prstDash val="solid"/>
+                    </a:lnBlToTr>
+                  </a:tcPr>
+                </a:tc>
+                <a:tc hMerge="1">
+                  <a:txBody>
+                    <a:bodyPr/>
+                    <a:lstStyle/>
+                    <a:p>
+                      <a:endParaRPr lang="en-US"/>
+                    </a:p>
+                  </a:txBody>
+                  <a:tcPr/>
+                </a:tc>
+              </a:tr>
+              <a:tr h="144405">
+                <a:tc>
+                  <a:txBody>
+                    <a:bodyPr/>
+                    <a:lstStyle/>
+                    <a:p>
+                      <a:pPr lvl="0"/>
+                      <a:r>
+                        <a:rPr lang="en-US" sz="1100" b="0" dirty="0" smtClean="0"/>
+                        <a:t>        </a:t>
+                      </a:r>
+                      <a:r>
+                        <a:rPr lang="en-US" sz="1100" b="0" dirty="0" err="1" smtClean="0"/>
+                        <a:t>ElectronicAddressIdentifier</a:t>
+                      </a:r>
+                      <a:endParaRPr lang="en-US" sz="1100" b="0" dirty="0"/>
+                    </a:p>
+                  </a:txBody>
+                  <a:tcPr>
+                    <a:lnL w="12700" cap="flat" cmpd="sng" algn="ctr">
+                      <a:solidFill>
+                        <a:schemeClr val="tx1"/>
+                      </a:solidFill>
+                      <a:prstDash val="solid"/>
+                      <a:round/>
+                      <a:headEnd type="none" w="med" len="med"/>
+                      <a:tailEnd type="none" w="med" len="med"/>
+                    </a:lnL>
+                    <a:lnR w="12700" cap="flat" cmpd="sng" algn="ctr">
+                      <a:solidFill>
+                        <a:schemeClr val="tx1"/>
+                      </a:solidFill>
+                      <a:prstDash val="solid"/>
+                      <a:round/>
+                      <a:headEnd type="none" w="med" len="med"/>
+                      <a:tailEnd type="none" w="med" len="med"/>
+                    </a:lnR>
+                  </a:tcPr>
+                </a:tc>
+                <a:tc gridSpan="2">
+                  <a:txBody>
+                    <a:bodyPr/>
+                    <a:lstStyle/>
+                    <a:p>
+                      <a:pPr marL="0" marR="0" indent="0" algn="l" defTabSz="914400" rtl="0" eaLnBrk="1" fontAlgn="auto" latinLnBrk="0" hangingPunct="1">
+                        <a:lnSpc>
+                          <a:spcPct val="100000"/>
+                        </a:lnSpc>
+                        <a:spcBef>
+                          <a:spcPts val="0"/>
+                        </a:spcBef>
+                        <a:spcAft>
+                          <a:spcPts val="0"/>
+                        </a:spcAft>
+                        <a:buClrTx/>
+                        <a:buSzTx/>
+                        <a:buFontTx/>
+                        <a:buNone/>
+                        <a:tabLst/>
+                        <a:defRPr/>
+                      </a:pPr>
+                      <a:r>
+                        <a:rPr lang="en-US" sz="1100" dirty="0" smtClean="0"/>
+                        <a:t>disco-team@stealthemail.com</a:t>
                       </a:r>
                       <a:endParaRPr lang="en-US" sz="1100" b="0" dirty="0" smtClean="0"/>
                     </a:p>
@@ -4830,7 +5069,6 @@
                         <a:rPr lang="en-US" sz="1100" b="0" dirty="0" smtClean="0"/>
                         <a:t>United States</a:t>
                       </a:r>
-                      <a:endParaRPr lang="en-US" sz="1100" b="0" dirty="0" smtClean="0"/>
                     </a:p>
                   </a:txBody>
                   <a:tcPr>
@@ -5081,7 +5319,6 @@
                         <a:rPr lang="en-US" sz="1100" b="0" dirty="0" smtClean="0"/>
                         <a:t>California</a:t>
                       </a:r>
-                      <a:endParaRPr lang="en-US" sz="1100" b="0" dirty="0" smtClean="0"/>
                     </a:p>
                   </a:txBody>
                   <a:tcPr>

</xml_diff>